<commit_message>
Minor edits to final presentation.
</commit_message>
<xml_diff>
--- a/team7_MRI.pptx
+++ b/team7_MRI.pptx
@@ -14134,10 +14134,10 @@
               <a:buChar char="●"/>
             </a:pPr>
             <a:r>
-              <a:rPr lang="en"/>
+              <a:rPr lang="en" dirty="0"/>
               <a:t>For this sample population, we succeeded in finding:</a:t>
             </a:r>
-            <a:endParaRPr/>
+            <a:endParaRPr dirty="0"/>
           </a:p>
           <a:p>
             <a:pPr marL="914400" lvl="1" indent="-317500" algn="l" rtl="0">
@@ -14151,10 +14151,18 @@
               <a:buChar char="○"/>
             </a:pPr>
             <a:r>
+              <a:rPr lang="en" dirty="0"/>
+              <a:t>The age </a:t>
+            </a:r>
+            <a:r>
               <a:rPr lang="en"/>
-              <a:t>The age group (71-76) with a higher prevalence of dementia.</a:t>
-            </a:r>
-            <a:endParaRPr/>
+              <a:t>group (66-76</a:t>
+            </a:r>
+            <a:r>
+              <a:rPr lang="en" dirty="0"/>
+              <a:t>) with a higher prevalence of dementia.</a:t>
+            </a:r>
+            <a:endParaRPr dirty="0"/>
           </a:p>
           <a:p>
             <a:pPr marL="914400" lvl="1" indent="-317500" algn="l" rtl="0">
@@ -14168,10 +14176,10 @@
               <a:buChar char="○"/>
             </a:pPr>
             <a:r>
-              <a:rPr lang="en"/>
+              <a:rPr lang="en" dirty="0"/>
               <a:t>A negative linear trend between CDR score and MMSE score.</a:t>
             </a:r>
-            <a:endParaRPr/>
+            <a:endParaRPr dirty="0"/>
           </a:p>
           <a:p>
             <a:pPr marL="914400" lvl="1" indent="-317500" algn="l" rtl="0">
@@ -14185,10 +14193,10 @@
               <a:buChar char="○"/>
             </a:pPr>
             <a:r>
-              <a:rPr lang="en"/>
+              <a:rPr lang="en" dirty="0"/>
               <a:t>A significant difference in normalized whole brain volume between groups.</a:t>
             </a:r>
-            <a:endParaRPr/>
+            <a:endParaRPr dirty="0"/>
           </a:p>
           <a:p>
             <a:pPr marL="914400" lvl="0" indent="0" algn="l" rtl="0">
@@ -14200,7 +14208,7 @@
               </a:spcAft>
               <a:buNone/>
             </a:pPr>
-            <a:endParaRPr/>
+            <a:endParaRPr dirty="0"/>
           </a:p>
           <a:p>
             <a:pPr marL="457200" lvl="0" indent="-342900" algn="l" rtl="0">
@@ -14214,10 +14222,10 @@
               <a:buChar char="●"/>
             </a:pPr>
             <a:r>
-              <a:rPr lang="en"/>
+              <a:rPr lang="en" dirty="0"/>
               <a:t>We were not able to find:</a:t>
             </a:r>
-            <a:endParaRPr/>
+            <a:endParaRPr dirty="0"/>
           </a:p>
           <a:p>
             <a:pPr marL="914400" lvl="1" indent="-317500" algn="l" rtl="0">
@@ -14231,10 +14239,10 @@
               <a:buChar char="○"/>
             </a:pPr>
             <a:r>
-              <a:rPr lang="en"/>
+              <a:rPr lang="en" dirty="0"/>
               <a:t>If one gender had higher prevalence of dementia.</a:t>
             </a:r>
-            <a:endParaRPr/>
+            <a:endParaRPr dirty="0"/>
           </a:p>
           <a:p>
             <a:pPr marL="914400" lvl="1" indent="-317500" algn="l" rtl="0">
@@ -14248,10 +14256,10 @@
               <a:buChar char="○"/>
             </a:pPr>
             <a:r>
-              <a:rPr lang="en"/>
+              <a:rPr lang="en" dirty="0"/>
               <a:t>A relationship between socioeconomic status and prevalence of dementia.</a:t>
             </a:r>
-            <a:endParaRPr/>
+            <a:endParaRPr dirty="0"/>
           </a:p>
           <a:p>
             <a:pPr marL="914400" lvl="1" indent="-317500" algn="l" rtl="0">
@@ -14265,10 +14273,10 @@
               <a:buChar char="○"/>
             </a:pPr>
             <a:r>
-              <a:rPr lang="en"/>
+              <a:rPr lang="en" dirty="0"/>
               <a:t>A significant difference in estimated intracranial volume between groups.</a:t>
             </a:r>
-            <a:endParaRPr/>
+            <a:endParaRPr dirty="0"/>
           </a:p>
         </p:txBody>
       </p:sp>

</xml_diff>